<commit_message>
jul18 - folder structure changes.
</commit_message>
<xml_diff>
--- a/AdvanceJSandTS/AdvJSandTS.pptx
+++ b/AdvanceJSandTS/AdvJSandTS.pptx
@@ -17,7 +17,9 @@
     <p:sldId id="266" r:id="rId11"/>
     <p:sldId id="267" r:id="rId12"/>
     <p:sldId id="268" r:id="rId13"/>
-    <p:sldId id="262" r:id="rId14"/>
+    <p:sldId id="269" r:id="rId14"/>
+    <p:sldId id="270" r:id="rId15"/>
+    <p:sldId id="262" r:id="rId16"/>
   </p:sldIdLst>
   <p:sldSz cx="12192000" cy="6858000"/>
   <p:notesSz cx="6858000" cy="9144000"/>
@@ -3810,7 +3812,7 @@
         <p:spPr>
           <a:xfrm>
             <a:off x="535675" y="1255595"/>
-            <a:ext cx="11037626" cy="3973524"/>
+            <a:ext cx="11037626" cy="5220019"/>
           </a:xfrm>
           <a:prstGeom prst="rect">
             <a:avLst/>
@@ -3905,6 +3907,51 @@
               </a:rPr>
               <a:t>https://www.freecodecamp.org/news/lets-learn-javascript-closures-66feb44f6a44/</a:t>
             </a:r>
+            <a:endParaRPr lang="en-IN" dirty="0">
+              <a:solidFill>
+                <a:schemeClr val="bg1"/>
+              </a:solidFill>
+            </a:endParaRPr>
+          </a:p>
+          <a:p>
+            <a:pPr algn="just">
+              <a:lnSpc>
+                <a:spcPct val="150000"/>
+              </a:lnSpc>
+            </a:pPr>
+            <a:endParaRPr lang="en-IN" dirty="0">
+              <a:solidFill>
+                <a:schemeClr val="bg1"/>
+              </a:solidFill>
+            </a:endParaRPr>
+          </a:p>
+          <a:p>
+            <a:pPr algn="just">
+              <a:lnSpc>
+                <a:spcPct val="150000"/>
+              </a:lnSpc>
+            </a:pPr>
+            <a:r>
+              <a:rPr lang="en-IN" dirty="0">
+                <a:solidFill>
+                  <a:schemeClr val="bg1"/>
+                </a:solidFill>
+                <a:hlinkClick r:id="rId3"/>
+              </a:rPr>
+              <a:t>https://www.geeksforgeeks.org/closure-in-javascript/</a:t>
+            </a:r>
+            <a:endParaRPr lang="en-IN" dirty="0">
+              <a:solidFill>
+                <a:schemeClr val="bg1"/>
+              </a:solidFill>
+            </a:endParaRPr>
+          </a:p>
+          <a:p>
+            <a:pPr algn="just">
+              <a:lnSpc>
+                <a:spcPct val="150000"/>
+              </a:lnSpc>
+            </a:pPr>
             <a:endParaRPr lang="en-IN" dirty="0">
               <a:solidFill>
                 <a:schemeClr val="bg1"/>
@@ -4181,6 +4228,735 @@
 </file>
 
 <file path=ppt/slides/slide13.xml><?xml version="1.0" encoding="utf-8"?>
+<p:sld xmlns:a="http://schemas.openxmlformats.org/drawingml/2006/main" xmlns:r="http://schemas.openxmlformats.org/officeDocument/2006/relationships" xmlns:p="http://schemas.openxmlformats.org/presentationml/2006/main">
+  <p:cSld>
+    <p:spTree>
+      <p:nvGrpSpPr>
+        <p:cNvPr id="1" name=""/>
+        <p:cNvGrpSpPr/>
+        <p:nvPr/>
+      </p:nvGrpSpPr>
+      <p:grpSpPr>
+        <a:xfrm>
+          <a:off x="0" y="0"/>
+          <a:ext cx="0" cy="0"/>
+          <a:chOff x="0" y="0"/>
+          <a:chExt cx="0" cy="0"/>
+        </a:xfrm>
+      </p:grpSpPr>
+      <p:sp>
+        <p:nvSpPr>
+          <p:cNvPr id="4" name="Title 1">
+            <a:extLst>
+              <a:ext uri="{FF2B5EF4-FFF2-40B4-BE49-F238E27FC236}">
+                <a16:creationId xmlns:a16="http://schemas.microsoft.com/office/drawing/2014/main" id="{D5FD72E1-A3C4-34E5-79DF-5988263F325E}"/>
+              </a:ext>
+            </a:extLst>
+          </p:cNvPr>
+          <p:cNvSpPr txBox="1">
+            <a:spLocks/>
+          </p:cNvSpPr>
+          <p:nvPr/>
+        </p:nvSpPr>
+        <p:spPr>
+          <a:xfrm>
+            <a:off x="411573" y="419717"/>
+            <a:ext cx="10515600" cy="835878"/>
+          </a:xfrm>
+          <a:prstGeom prst="rect">
+            <a:avLst/>
+          </a:prstGeom>
+        </p:spPr>
+        <p:txBody>
+          <a:bodyPr/>
+          <a:lstStyle>
+            <a:lvl1pPr algn="l" defTabSz="914400" rtl="0" eaLnBrk="1" latinLnBrk="0" hangingPunct="1">
+              <a:lnSpc>
+                <a:spcPct val="90000"/>
+              </a:lnSpc>
+              <a:spcBef>
+                <a:spcPct val="0"/>
+              </a:spcBef>
+              <a:buNone/>
+              <a:defRPr sz="4400" kern="1200">
+                <a:solidFill>
+                  <a:schemeClr val="tx1"/>
+                </a:solidFill>
+                <a:latin typeface="+mj-lt"/>
+                <a:ea typeface="+mj-ea"/>
+                <a:cs typeface="+mj-cs"/>
+              </a:defRPr>
+            </a:lvl1pPr>
+          </a:lstStyle>
+          <a:p>
+            <a:r>
+              <a:rPr lang="en-US" dirty="0">
+                <a:solidFill>
+                  <a:schemeClr val="bg1"/>
+                </a:solidFill>
+              </a:rPr>
+              <a:t>Rest Parameters &amp; Spread Operator:</a:t>
+            </a:r>
+            <a:endParaRPr lang="en-IN" dirty="0">
+              <a:solidFill>
+                <a:schemeClr val="bg1"/>
+              </a:solidFill>
+            </a:endParaRPr>
+          </a:p>
+        </p:txBody>
+      </p:sp>
+      <p:sp>
+        <p:nvSpPr>
+          <p:cNvPr id="5" name="TextBox 4">
+            <a:extLst>
+              <a:ext uri="{FF2B5EF4-FFF2-40B4-BE49-F238E27FC236}">
+                <a16:creationId xmlns:a16="http://schemas.microsoft.com/office/drawing/2014/main" id="{578C451A-2667-AF49-9A8C-D075C8D45152}"/>
+              </a:ext>
+            </a:extLst>
+          </p:cNvPr>
+          <p:cNvSpPr txBox="1"/>
+          <p:nvPr/>
+        </p:nvSpPr>
+        <p:spPr>
+          <a:xfrm>
+            <a:off x="535675" y="1255595"/>
+            <a:ext cx="11037626" cy="5593839"/>
+          </a:xfrm>
+          <a:prstGeom prst="rect">
+            <a:avLst/>
+          </a:prstGeom>
+          <a:noFill/>
+        </p:spPr>
+        <p:txBody>
+          <a:bodyPr wrap="square">
+            <a:spAutoFit/>
+          </a:bodyPr>
+          <a:lstStyle/>
+          <a:p>
+            <a:pPr algn="just">
+              <a:lnSpc>
+                <a:spcPct val="150000"/>
+              </a:lnSpc>
+            </a:pPr>
+            <a:r>
+              <a:rPr lang="en-US" sz="1600" b="0" i="0" dirty="0">
+                <a:solidFill>
+                  <a:schemeClr val="bg1"/>
+                </a:solidFill>
+                <a:effectLst/>
+                <a:latin typeface="Open Sans" panose="020B0606030504020204" pitchFamily="34" charset="0"/>
+              </a:rPr>
+              <a:t>Rest parameter is an improved way of handling function parameter, allowing us to more easily handle various input as parameters in a function. The rest parameter syntax allows us to represent an indefinite number of arguments as an array.</a:t>
+            </a:r>
+          </a:p>
+          <a:p>
+            <a:pPr algn="just">
+              <a:lnSpc>
+                <a:spcPct val="150000"/>
+              </a:lnSpc>
+            </a:pPr>
+            <a:endParaRPr lang="en-US" sz="1600" dirty="0">
+              <a:solidFill>
+                <a:schemeClr val="bg1"/>
+              </a:solidFill>
+              <a:latin typeface="Open Sans" panose="020B0606030504020204" pitchFamily="34" charset="0"/>
+            </a:endParaRPr>
+          </a:p>
+          <a:p>
+            <a:pPr algn="just">
+              <a:lnSpc>
+                <a:spcPct val="150000"/>
+              </a:lnSpc>
+            </a:pPr>
+            <a:r>
+              <a:rPr lang="en-US" sz="1600" b="0" i="0" dirty="0">
+                <a:solidFill>
+                  <a:schemeClr val="bg1"/>
+                </a:solidFill>
+                <a:effectLst/>
+                <a:latin typeface="Open Sans" panose="020B0606030504020204" pitchFamily="34" charset="0"/>
+              </a:rPr>
+              <a:t>// es6 rest parameter</a:t>
+            </a:r>
+          </a:p>
+          <a:p>
+            <a:pPr algn="just">
+              <a:lnSpc>
+                <a:spcPct val="150000"/>
+              </a:lnSpc>
+            </a:pPr>
+            <a:r>
+              <a:rPr lang="en-US" sz="1600" b="0" i="0" dirty="0">
+                <a:solidFill>
+                  <a:schemeClr val="bg1"/>
+                </a:solidFill>
+                <a:effectLst/>
+                <a:latin typeface="Open Sans" panose="020B0606030504020204" pitchFamily="34" charset="0"/>
+              </a:rPr>
+              <a:t>function fun(...input){</a:t>
+            </a:r>
+          </a:p>
+          <a:p>
+            <a:pPr algn="just">
+              <a:lnSpc>
+                <a:spcPct val="150000"/>
+              </a:lnSpc>
+            </a:pPr>
+            <a:r>
+              <a:rPr lang="en-US" sz="1600" b="0" i="0" dirty="0">
+                <a:solidFill>
+                  <a:schemeClr val="bg1"/>
+                </a:solidFill>
+                <a:effectLst/>
+                <a:latin typeface="Open Sans" panose="020B0606030504020204" pitchFamily="34" charset="0"/>
+              </a:rPr>
+              <a:t>let sum = 0;</a:t>
+            </a:r>
+          </a:p>
+          <a:p>
+            <a:pPr algn="just">
+              <a:lnSpc>
+                <a:spcPct val="150000"/>
+              </a:lnSpc>
+            </a:pPr>
+            <a:r>
+              <a:rPr lang="en-US" sz="1600" b="0" i="0" dirty="0">
+                <a:solidFill>
+                  <a:schemeClr val="bg1"/>
+                </a:solidFill>
+                <a:effectLst/>
+                <a:latin typeface="Open Sans" panose="020B0606030504020204" pitchFamily="34" charset="0"/>
+              </a:rPr>
+              <a:t>for(let </a:t>
+            </a:r>
+            <a:r>
+              <a:rPr lang="en-US" sz="1600" b="0" i="0" dirty="0" err="1">
+                <a:solidFill>
+                  <a:schemeClr val="bg1"/>
+                </a:solidFill>
+                <a:effectLst/>
+                <a:latin typeface="Open Sans" panose="020B0606030504020204" pitchFamily="34" charset="0"/>
+              </a:rPr>
+              <a:t>i</a:t>
+            </a:r>
+            <a:r>
+              <a:rPr lang="en-US" sz="1600" b="0" i="0" dirty="0">
+                <a:solidFill>
+                  <a:schemeClr val="bg1"/>
+                </a:solidFill>
+                <a:effectLst/>
+                <a:latin typeface="Open Sans" panose="020B0606030504020204" pitchFamily="34" charset="0"/>
+              </a:rPr>
+              <a:t> of input){</a:t>
+            </a:r>
+          </a:p>
+          <a:p>
+            <a:pPr algn="just">
+              <a:lnSpc>
+                <a:spcPct val="150000"/>
+              </a:lnSpc>
+            </a:pPr>
+            <a:r>
+              <a:rPr lang="en-US" sz="1600" b="0" i="0" dirty="0">
+                <a:solidFill>
+                  <a:schemeClr val="bg1"/>
+                </a:solidFill>
+                <a:effectLst/>
+                <a:latin typeface="Open Sans" panose="020B0606030504020204" pitchFamily="34" charset="0"/>
+              </a:rPr>
+              <a:t>sum+=</a:t>
+            </a:r>
+            <a:r>
+              <a:rPr lang="en-US" sz="1600" b="0" i="0" dirty="0" err="1">
+                <a:solidFill>
+                  <a:schemeClr val="bg1"/>
+                </a:solidFill>
+                <a:effectLst/>
+                <a:latin typeface="Open Sans" panose="020B0606030504020204" pitchFamily="34" charset="0"/>
+              </a:rPr>
+              <a:t>i</a:t>
+            </a:r>
+            <a:r>
+              <a:rPr lang="en-US" sz="1600" b="0" i="0" dirty="0">
+                <a:solidFill>
+                  <a:schemeClr val="bg1"/>
+                </a:solidFill>
+                <a:effectLst/>
+                <a:latin typeface="Open Sans" panose="020B0606030504020204" pitchFamily="34" charset="0"/>
+              </a:rPr>
+              <a:t>;</a:t>
+            </a:r>
+          </a:p>
+          <a:p>
+            <a:pPr algn="just">
+              <a:lnSpc>
+                <a:spcPct val="150000"/>
+              </a:lnSpc>
+            </a:pPr>
+            <a:r>
+              <a:rPr lang="en-US" sz="1600" b="0" i="0" dirty="0">
+                <a:solidFill>
+                  <a:schemeClr val="bg1"/>
+                </a:solidFill>
+                <a:effectLst/>
+                <a:latin typeface="Open Sans" panose="020B0606030504020204" pitchFamily="34" charset="0"/>
+              </a:rPr>
+              <a:t>}</a:t>
+            </a:r>
+          </a:p>
+          <a:p>
+            <a:pPr algn="just">
+              <a:lnSpc>
+                <a:spcPct val="150000"/>
+              </a:lnSpc>
+            </a:pPr>
+            <a:r>
+              <a:rPr lang="en-US" sz="1600" b="0" i="0" dirty="0">
+                <a:solidFill>
+                  <a:schemeClr val="bg1"/>
+                </a:solidFill>
+                <a:effectLst/>
+                <a:latin typeface="Open Sans" panose="020B0606030504020204" pitchFamily="34" charset="0"/>
+              </a:rPr>
+              <a:t>return sum;</a:t>
+            </a:r>
+          </a:p>
+          <a:p>
+            <a:pPr algn="just">
+              <a:lnSpc>
+                <a:spcPct val="150000"/>
+              </a:lnSpc>
+            </a:pPr>
+            <a:r>
+              <a:rPr lang="en-US" sz="1600" b="0" i="0" dirty="0">
+                <a:solidFill>
+                  <a:schemeClr val="bg1"/>
+                </a:solidFill>
+                <a:effectLst/>
+                <a:latin typeface="Open Sans" panose="020B0606030504020204" pitchFamily="34" charset="0"/>
+              </a:rPr>
+              <a:t>}</a:t>
+            </a:r>
+          </a:p>
+          <a:p>
+            <a:pPr algn="just">
+              <a:lnSpc>
+                <a:spcPct val="150000"/>
+              </a:lnSpc>
+            </a:pPr>
+            <a:r>
+              <a:rPr lang="en-US" sz="1600" b="0" i="0" dirty="0">
+                <a:solidFill>
+                  <a:schemeClr val="bg1"/>
+                </a:solidFill>
+                <a:effectLst/>
+                <a:latin typeface="Open Sans" panose="020B0606030504020204" pitchFamily="34" charset="0"/>
+              </a:rPr>
+              <a:t>console.log(fun(1,2)); //3</a:t>
+            </a:r>
+          </a:p>
+          <a:p>
+            <a:pPr algn="just">
+              <a:lnSpc>
+                <a:spcPct val="150000"/>
+              </a:lnSpc>
+            </a:pPr>
+            <a:r>
+              <a:rPr lang="en-US" sz="1600" b="0" i="0" dirty="0">
+                <a:solidFill>
+                  <a:schemeClr val="bg1"/>
+                </a:solidFill>
+                <a:effectLst/>
+                <a:latin typeface="Open Sans" panose="020B0606030504020204" pitchFamily="34" charset="0"/>
+              </a:rPr>
+              <a:t>console.log(fun(1,2,4)); //4</a:t>
+            </a:r>
+          </a:p>
+          <a:p>
+            <a:pPr algn="just">
+              <a:lnSpc>
+                <a:spcPct val="150000"/>
+              </a:lnSpc>
+            </a:pPr>
+            <a:r>
+              <a:rPr lang="en-US" sz="1600" b="0" i="0" dirty="0">
+                <a:solidFill>
+                  <a:schemeClr val="bg1"/>
+                </a:solidFill>
+                <a:effectLst/>
+                <a:latin typeface="Open Sans" panose="020B0606030504020204" pitchFamily="34" charset="0"/>
+              </a:rPr>
+              <a:t>console.log(fun(1,2,4,6)); //13</a:t>
+            </a:r>
+            <a:endParaRPr lang="en-IN" dirty="0">
+              <a:solidFill>
+                <a:schemeClr val="bg1"/>
+              </a:solidFill>
+            </a:endParaRPr>
+          </a:p>
+        </p:txBody>
+      </p:sp>
+    </p:spTree>
+    <p:extLst>
+      <p:ext uri="{BB962C8B-B14F-4D97-AF65-F5344CB8AC3E}">
+        <p14:creationId xmlns:p14="http://schemas.microsoft.com/office/powerpoint/2010/main" val="1595622024"/>
+      </p:ext>
+    </p:extLst>
+  </p:cSld>
+  <p:clrMapOvr>
+    <a:masterClrMapping/>
+  </p:clrMapOvr>
+</p:sld>
+</file>
+
+<file path=ppt/slides/slide14.xml><?xml version="1.0" encoding="utf-8"?>
+<p:sld xmlns:a="http://schemas.openxmlformats.org/drawingml/2006/main" xmlns:r="http://schemas.openxmlformats.org/officeDocument/2006/relationships" xmlns:p="http://schemas.openxmlformats.org/presentationml/2006/main">
+  <p:cSld>
+    <p:spTree>
+      <p:nvGrpSpPr>
+        <p:cNvPr id="1" name=""/>
+        <p:cNvGrpSpPr/>
+        <p:nvPr/>
+      </p:nvGrpSpPr>
+      <p:grpSpPr>
+        <a:xfrm>
+          <a:off x="0" y="0"/>
+          <a:ext cx="0" cy="0"/>
+          <a:chOff x="0" y="0"/>
+          <a:chExt cx="0" cy="0"/>
+        </a:xfrm>
+      </p:grpSpPr>
+      <p:sp>
+        <p:nvSpPr>
+          <p:cNvPr id="4" name="Title 1">
+            <a:extLst>
+              <a:ext uri="{FF2B5EF4-FFF2-40B4-BE49-F238E27FC236}">
+                <a16:creationId xmlns:a16="http://schemas.microsoft.com/office/drawing/2014/main" id="{D5FD72E1-A3C4-34E5-79DF-5988263F325E}"/>
+              </a:ext>
+            </a:extLst>
+          </p:cNvPr>
+          <p:cNvSpPr txBox="1">
+            <a:spLocks/>
+          </p:cNvSpPr>
+          <p:nvPr/>
+        </p:nvSpPr>
+        <p:spPr>
+          <a:xfrm>
+            <a:off x="411573" y="419717"/>
+            <a:ext cx="10515600" cy="835878"/>
+          </a:xfrm>
+          <a:prstGeom prst="rect">
+            <a:avLst/>
+          </a:prstGeom>
+        </p:spPr>
+        <p:txBody>
+          <a:bodyPr/>
+          <a:lstStyle>
+            <a:lvl1pPr algn="l" defTabSz="914400" rtl="0" eaLnBrk="1" latinLnBrk="0" hangingPunct="1">
+              <a:lnSpc>
+                <a:spcPct val="90000"/>
+              </a:lnSpc>
+              <a:spcBef>
+                <a:spcPct val="0"/>
+              </a:spcBef>
+              <a:buNone/>
+              <a:defRPr sz="4400" kern="1200">
+                <a:solidFill>
+                  <a:schemeClr val="tx1"/>
+                </a:solidFill>
+                <a:latin typeface="+mj-lt"/>
+                <a:ea typeface="+mj-ea"/>
+                <a:cs typeface="+mj-cs"/>
+              </a:defRPr>
+            </a:lvl1pPr>
+          </a:lstStyle>
+          <a:p>
+            <a:r>
+              <a:rPr lang="en-US" dirty="0">
+                <a:solidFill>
+                  <a:schemeClr val="bg1"/>
+                </a:solidFill>
+              </a:rPr>
+              <a:t>Spread Operator:</a:t>
+            </a:r>
+            <a:endParaRPr lang="en-IN" dirty="0">
+              <a:solidFill>
+                <a:schemeClr val="bg1"/>
+              </a:solidFill>
+            </a:endParaRPr>
+          </a:p>
+        </p:txBody>
+      </p:sp>
+      <p:sp>
+        <p:nvSpPr>
+          <p:cNvPr id="5" name="TextBox 4">
+            <a:extLst>
+              <a:ext uri="{FF2B5EF4-FFF2-40B4-BE49-F238E27FC236}">
+                <a16:creationId xmlns:a16="http://schemas.microsoft.com/office/drawing/2014/main" id="{578C451A-2667-AF49-9A8C-D075C8D45152}"/>
+              </a:ext>
+            </a:extLst>
+          </p:cNvPr>
+          <p:cNvSpPr txBox="1"/>
+          <p:nvPr/>
+        </p:nvSpPr>
+        <p:spPr>
+          <a:xfrm>
+            <a:off x="535675" y="1255595"/>
+            <a:ext cx="11037626" cy="4023345"/>
+          </a:xfrm>
+          <a:prstGeom prst="rect">
+            <a:avLst/>
+          </a:prstGeom>
+          <a:noFill/>
+        </p:spPr>
+        <p:txBody>
+          <a:bodyPr wrap="square">
+            <a:spAutoFit/>
+          </a:bodyPr>
+          <a:lstStyle/>
+          <a:p>
+            <a:pPr algn="just">
+              <a:lnSpc>
+                <a:spcPct val="150000"/>
+              </a:lnSpc>
+            </a:pPr>
+            <a:r>
+              <a:rPr lang="en-US" sz="2000" b="0" i="0" dirty="0">
+                <a:solidFill>
+                  <a:schemeClr val="bg1"/>
+                </a:solidFill>
+                <a:effectLst/>
+                <a:latin typeface="Open Sans" panose="020B0606030504020204" pitchFamily="34" charset="0"/>
+              </a:rPr>
+              <a:t>Spread operator allows an </a:t>
+            </a:r>
+            <a:r>
+              <a:rPr lang="en-US" sz="2000" b="0" i="0" dirty="0" err="1">
+                <a:solidFill>
+                  <a:schemeClr val="bg1"/>
+                </a:solidFill>
+                <a:effectLst/>
+                <a:latin typeface="Open Sans" panose="020B0606030504020204" pitchFamily="34" charset="0"/>
+              </a:rPr>
+              <a:t>iterable</a:t>
+            </a:r>
+            <a:r>
+              <a:rPr lang="en-US" sz="2000" b="0" i="0" dirty="0">
+                <a:solidFill>
+                  <a:schemeClr val="bg1"/>
+                </a:solidFill>
+                <a:effectLst/>
+                <a:latin typeface="Open Sans" panose="020B0606030504020204" pitchFamily="34" charset="0"/>
+              </a:rPr>
+              <a:t> to expand in places where 0+ arguments are expected. It is mostly used in variable array where there is more than 1 values are expected. It allows us the privilege to obtain a list of parameters from an array.</a:t>
+            </a:r>
+          </a:p>
+          <a:p>
+            <a:pPr algn="just">
+              <a:lnSpc>
+                <a:spcPct val="150000"/>
+              </a:lnSpc>
+            </a:pPr>
+            <a:endParaRPr lang="en-US" sz="1600" dirty="0">
+              <a:solidFill>
+                <a:schemeClr val="bg1"/>
+              </a:solidFill>
+              <a:latin typeface="Open Sans" panose="020B0606030504020204" pitchFamily="34" charset="0"/>
+            </a:endParaRPr>
+          </a:p>
+          <a:p>
+            <a:pPr algn="just">
+              <a:lnSpc>
+                <a:spcPct val="150000"/>
+              </a:lnSpc>
+            </a:pPr>
+            <a:r>
+              <a:rPr lang="en-US" sz="1600" dirty="0">
+                <a:solidFill>
+                  <a:schemeClr val="bg1"/>
+                </a:solidFill>
+                <a:latin typeface="Open Sans" panose="020B0606030504020204" pitchFamily="34" charset="0"/>
+              </a:rPr>
+              <a:t>// spread operator doing the </a:t>
+            </a:r>
+            <a:r>
+              <a:rPr lang="en-US" sz="1600" dirty="0" err="1">
+                <a:solidFill>
+                  <a:schemeClr val="bg1"/>
+                </a:solidFill>
+                <a:latin typeface="Open Sans" panose="020B0606030504020204" pitchFamily="34" charset="0"/>
+              </a:rPr>
+              <a:t>concat</a:t>
+            </a:r>
+            <a:r>
+              <a:rPr lang="en-US" sz="1600" dirty="0">
+                <a:solidFill>
+                  <a:schemeClr val="bg1"/>
+                </a:solidFill>
+                <a:latin typeface="Open Sans" panose="020B0606030504020204" pitchFamily="34" charset="0"/>
+              </a:rPr>
+              <a:t> job</a:t>
+            </a:r>
+          </a:p>
+          <a:p>
+            <a:pPr algn="just">
+              <a:lnSpc>
+                <a:spcPct val="150000"/>
+              </a:lnSpc>
+            </a:pPr>
+            <a:r>
+              <a:rPr lang="en-US" sz="1600" dirty="0">
+                <a:solidFill>
+                  <a:schemeClr val="bg1"/>
+                </a:solidFill>
+                <a:latin typeface="Open Sans" panose="020B0606030504020204" pitchFamily="34" charset="0"/>
+              </a:rPr>
+              <a:t>let </a:t>
+            </a:r>
+            <a:r>
+              <a:rPr lang="en-US" sz="1600" dirty="0" err="1">
+                <a:solidFill>
+                  <a:schemeClr val="bg1"/>
+                </a:solidFill>
+                <a:latin typeface="Open Sans" panose="020B0606030504020204" pitchFamily="34" charset="0"/>
+              </a:rPr>
+              <a:t>arr</a:t>
+            </a:r>
+            <a:r>
+              <a:rPr lang="en-US" sz="1600" dirty="0">
+                <a:solidFill>
+                  <a:schemeClr val="bg1"/>
+                </a:solidFill>
+                <a:latin typeface="Open Sans" panose="020B0606030504020204" pitchFamily="34" charset="0"/>
+              </a:rPr>
+              <a:t> = [1,2,3];</a:t>
+            </a:r>
+          </a:p>
+          <a:p>
+            <a:pPr algn="just">
+              <a:lnSpc>
+                <a:spcPct val="150000"/>
+              </a:lnSpc>
+            </a:pPr>
+            <a:r>
+              <a:rPr lang="en-US" sz="1600" dirty="0">
+                <a:solidFill>
+                  <a:schemeClr val="bg1"/>
+                </a:solidFill>
+                <a:latin typeface="Open Sans" panose="020B0606030504020204" pitchFamily="34" charset="0"/>
+              </a:rPr>
+              <a:t>let arr2 = [4,5,6];</a:t>
+            </a:r>
+          </a:p>
+          <a:p>
+            <a:pPr algn="just">
+              <a:lnSpc>
+                <a:spcPct val="150000"/>
+              </a:lnSpc>
+            </a:pPr>
+            <a:r>
+              <a:rPr lang="en-US" sz="1600" dirty="0">
+                <a:solidFill>
+                  <a:schemeClr val="bg1"/>
+                </a:solidFill>
+                <a:latin typeface="Open Sans" panose="020B0606030504020204" pitchFamily="34" charset="0"/>
+              </a:rPr>
+              <a:t> </a:t>
+            </a:r>
+          </a:p>
+          <a:p>
+            <a:pPr algn="just">
+              <a:lnSpc>
+                <a:spcPct val="150000"/>
+              </a:lnSpc>
+            </a:pPr>
+            <a:r>
+              <a:rPr lang="en-US" sz="1600" dirty="0" err="1">
+                <a:solidFill>
+                  <a:schemeClr val="bg1"/>
+                </a:solidFill>
+                <a:latin typeface="Open Sans" panose="020B0606030504020204" pitchFamily="34" charset="0"/>
+              </a:rPr>
+              <a:t>arr</a:t>
+            </a:r>
+            <a:r>
+              <a:rPr lang="en-US" sz="1600" dirty="0">
+                <a:solidFill>
+                  <a:schemeClr val="bg1"/>
+                </a:solidFill>
+                <a:latin typeface="Open Sans" panose="020B0606030504020204" pitchFamily="34" charset="0"/>
+              </a:rPr>
+              <a:t> = [...</a:t>
+            </a:r>
+            <a:r>
+              <a:rPr lang="en-US" sz="1600" dirty="0" err="1">
+                <a:solidFill>
+                  <a:schemeClr val="bg1"/>
+                </a:solidFill>
+                <a:latin typeface="Open Sans" panose="020B0606030504020204" pitchFamily="34" charset="0"/>
+              </a:rPr>
+              <a:t>arr</a:t>
+            </a:r>
+            <a:r>
+              <a:rPr lang="en-US" sz="1600" dirty="0">
+                <a:solidFill>
+                  <a:schemeClr val="bg1"/>
+                </a:solidFill>
+                <a:latin typeface="Open Sans" panose="020B0606030504020204" pitchFamily="34" charset="0"/>
+              </a:rPr>
+              <a:t>,...arr2];</a:t>
+            </a:r>
+          </a:p>
+          <a:p>
+            <a:pPr algn="just">
+              <a:lnSpc>
+                <a:spcPct val="150000"/>
+              </a:lnSpc>
+            </a:pPr>
+            <a:r>
+              <a:rPr lang="en-US" sz="1600" dirty="0">
+                <a:solidFill>
+                  <a:schemeClr val="bg1"/>
+                </a:solidFill>
+                <a:latin typeface="Open Sans" panose="020B0606030504020204" pitchFamily="34" charset="0"/>
+              </a:rPr>
+              <a:t>console.log(</a:t>
+            </a:r>
+            <a:r>
+              <a:rPr lang="en-US" sz="1600" dirty="0" err="1">
+                <a:solidFill>
+                  <a:schemeClr val="bg1"/>
+                </a:solidFill>
+                <a:latin typeface="Open Sans" panose="020B0606030504020204" pitchFamily="34" charset="0"/>
+              </a:rPr>
+              <a:t>arr</a:t>
+            </a:r>
+            <a:r>
+              <a:rPr lang="en-US" sz="1600" dirty="0">
+                <a:solidFill>
+                  <a:schemeClr val="bg1"/>
+                </a:solidFill>
+                <a:latin typeface="Open Sans" panose="020B0606030504020204" pitchFamily="34" charset="0"/>
+              </a:rPr>
+              <a:t>); // [ 1, 2, 3, 4, 5,6 ]</a:t>
+            </a:r>
+          </a:p>
+        </p:txBody>
+      </p:sp>
+    </p:spTree>
+    <p:extLst>
+      <p:ext uri="{BB962C8B-B14F-4D97-AF65-F5344CB8AC3E}">
+        <p14:creationId xmlns:p14="http://schemas.microsoft.com/office/powerpoint/2010/main" val="1187574562"/>
+      </p:ext>
+    </p:extLst>
+  </p:cSld>
+  <p:clrMapOvr>
+    <a:masterClrMapping/>
+  </p:clrMapOvr>
+</p:sld>
+</file>
+
+<file path=ppt/slides/slide15.xml><?xml version="1.0" encoding="utf-8"?>
 <p:sld xmlns:a="http://schemas.openxmlformats.org/drawingml/2006/main" xmlns:r="http://schemas.openxmlformats.org/officeDocument/2006/relationships" xmlns:p="http://schemas.openxmlformats.org/presentationml/2006/main">
   <p:cSld>
     <p:spTree>

</xml_diff>